<commit_message>
Update Joven DG based on team's comments
</commit_message>
<xml_diff>
--- a/docs/diagrams/ImplementationSuggestionUML.pptx
+++ b/docs/diagrams/ImplementationSuggestionUML.pptx
@@ -104,6 +104,11 @@
       </a:defRPr>
     </a:lvl9pPr>
   </p:defaultTextStyle>
+  <p:extLst>
+    <p:ext uri="{EFAFB233-063F-42B5-8137-9DF3F51BA10A}">
+      <p15:sldGuideLst xmlns:p15="http://schemas.microsoft.com/office/powerpoint/2012/main"/>
+    </p:ext>
+  </p:extLst>
 </p:presentation>
 </file>
 
@@ -273,7 +278,7 @@
           <a:p>
             <a:fld id="{F9CD96CD-EDDD-473D-AA93-4DE9CC972760}" type="datetimeFigureOut">
               <a:rPr lang="en-SG" smtClean="0"/>
-              <a:t>22/10/2020</a:t>
+              <a:t>24/10/2020</a:t>
             </a:fld>
             <a:endParaRPr lang="en-SG"/>
           </a:p>
@@ -443,7 +448,7 @@
           <a:p>
             <a:fld id="{F9CD96CD-EDDD-473D-AA93-4DE9CC972760}" type="datetimeFigureOut">
               <a:rPr lang="en-SG" smtClean="0"/>
-              <a:t>22/10/2020</a:t>
+              <a:t>24/10/2020</a:t>
             </a:fld>
             <a:endParaRPr lang="en-SG"/>
           </a:p>
@@ -623,7 +628,7 @@
           <a:p>
             <a:fld id="{F9CD96CD-EDDD-473D-AA93-4DE9CC972760}" type="datetimeFigureOut">
               <a:rPr lang="en-SG" smtClean="0"/>
-              <a:t>22/10/2020</a:t>
+              <a:t>24/10/2020</a:t>
             </a:fld>
             <a:endParaRPr lang="en-SG"/>
           </a:p>
@@ -793,7 +798,7 @@
           <a:p>
             <a:fld id="{F9CD96CD-EDDD-473D-AA93-4DE9CC972760}" type="datetimeFigureOut">
               <a:rPr lang="en-SG" smtClean="0"/>
-              <a:t>22/10/2020</a:t>
+              <a:t>24/10/2020</a:t>
             </a:fld>
             <a:endParaRPr lang="en-SG"/>
           </a:p>
@@ -1039,7 +1044,7 @@
           <a:p>
             <a:fld id="{F9CD96CD-EDDD-473D-AA93-4DE9CC972760}" type="datetimeFigureOut">
               <a:rPr lang="en-SG" smtClean="0"/>
-              <a:t>22/10/2020</a:t>
+              <a:t>24/10/2020</a:t>
             </a:fld>
             <a:endParaRPr lang="en-SG"/>
           </a:p>
@@ -1271,7 +1276,7 @@
           <a:p>
             <a:fld id="{F9CD96CD-EDDD-473D-AA93-4DE9CC972760}" type="datetimeFigureOut">
               <a:rPr lang="en-SG" smtClean="0"/>
-              <a:t>22/10/2020</a:t>
+              <a:t>24/10/2020</a:t>
             </a:fld>
             <a:endParaRPr lang="en-SG"/>
           </a:p>
@@ -1638,7 +1643,7 @@
           <a:p>
             <a:fld id="{F9CD96CD-EDDD-473D-AA93-4DE9CC972760}" type="datetimeFigureOut">
               <a:rPr lang="en-SG" smtClean="0"/>
-              <a:t>22/10/2020</a:t>
+              <a:t>24/10/2020</a:t>
             </a:fld>
             <a:endParaRPr lang="en-SG"/>
           </a:p>
@@ -1756,7 +1761,7 @@
           <a:p>
             <a:fld id="{F9CD96CD-EDDD-473D-AA93-4DE9CC972760}" type="datetimeFigureOut">
               <a:rPr lang="en-SG" smtClean="0"/>
-              <a:t>22/10/2020</a:t>
+              <a:t>24/10/2020</a:t>
             </a:fld>
             <a:endParaRPr lang="en-SG"/>
           </a:p>
@@ -1851,7 +1856,7 @@
           <a:p>
             <a:fld id="{F9CD96CD-EDDD-473D-AA93-4DE9CC972760}" type="datetimeFigureOut">
               <a:rPr lang="en-SG" smtClean="0"/>
-              <a:t>22/10/2020</a:t>
+              <a:t>24/10/2020</a:t>
             </a:fld>
             <a:endParaRPr lang="en-SG"/>
           </a:p>
@@ -2128,7 +2133,7 @@
           <a:p>
             <a:fld id="{F9CD96CD-EDDD-473D-AA93-4DE9CC972760}" type="datetimeFigureOut">
               <a:rPr lang="en-SG" smtClean="0"/>
-              <a:t>22/10/2020</a:t>
+              <a:t>24/10/2020</a:t>
             </a:fld>
             <a:endParaRPr lang="en-SG"/>
           </a:p>
@@ -2381,7 +2386,7 @@
           <a:p>
             <a:fld id="{F9CD96CD-EDDD-473D-AA93-4DE9CC972760}" type="datetimeFigureOut">
               <a:rPr lang="en-SG" smtClean="0"/>
-              <a:t>22/10/2020</a:t>
+              <a:t>24/10/2020</a:t>
             </a:fld>
             <a:endParaRPr lang="en-SG"/>
           </a:p>
@@ -2594,7 +2599,7 @@
           <a:p>
             <a:fld id="{F9CD96CD-EDDD-473D-AA93-4DE9CC972760}" type="datetimeFigureOut">
               <a:rPr lang="en-SG" smtClean="0"/>
-              <a:t>22/10/2020</a:t>
+              <a:t>24/10/2020</a:t>
             </a:fld>
             <a:endParaRPr lang="en-SG"/>
           </a:p>
@@ -3114,7 +3119,7 @@
         </p:nvSpPr>
         <p:spPr>
           <a:xfrm>
-            <a:off x="7739867" y="397566"/>
+            <a:off x="7252034" y="406341"/>
             <a:ext cx="2623931" cy="371060"/>
           </a:xfrm>
           <a:prstGeom prst="rect">
@@ -3193,7 +3198,7 @@
         </p:nvCxnSpPr>
         <p:spPr>
           <a:xfrm>
-            <a:off x="12661" y="1692848"/>
+            <a:off x="7545" y="1646176"/>
             <a:ext cx="775227" cy="11175"/>
           </a:xfrm>
           <a:prstGeom prst="straightConnector1">
@@ -3259,8 +3264,8 @@
         </p:nvCxnSpPr>
         <p:spPr>
           <a:xfrm flipH="1">
-            <a:off x="920475" y="1215997"/>
-            <a:ext cx="1" cy="314740"/>
+            <a:off x="920476" y="1215997"/>
+            <a:ext cx="1" cy="4681734"/>
           </a:xfrm>
           <a:prstGeom prst="line">
             <a:avLst/>
@@ -3605,7 +3610,7 @@
         </p:nvSpPr>
         <p:spPr>
           <a:xfrm>
-            <a:off x="8255790" y="1387797"/>
+            <a:off x="8344825" y="1474190"/>
             <a:ext cx="1868557" cy="276999"/>
           </a:xfrm>
           <a:prstGeom prst="rect">
@@ -3638,13 +3643,15 @@
       <p:cxnSp>
         <p:nvCxnSpPr>
           <p:cNvPr id="38" name="Straight Connector 37"/>
-          <p:cNvCxnSpPr/>
+          <p:cNvCxnSpPr>
+            <a:endCxn id="40" idx="2"/>
+          </p:cNvCxnSpPr>
           <p:nvPr/>
         </p:nvCxnSpPr>
         <p:spPr>
-          <a:xfrm>
-            <a:off x="10053519" y="2374404"/>
-            <a:ext cx="23783" cy="3509562"/>
+          <a:xfrm flipH="1">
+            <a:off x="10053518" y="2374404"/>
+            <a:ext cx="1" cy="123453"/>
           </a:xfrm>
           <a:prstGeom prst="line">
             <a:avLst/>
@@ -3787,9 +3794,9 @@
           <p:nvPr/>
         </p:nvCxnSpPr>
         <p:spPr>
-          <a:xfrm flipH="1">
-            <a:off x="11463907" y="1181740"/>
-            <a:ext cx="1" cy="940049"/>
+          <a:xfrm>
+            <a:off x="11463909" y="1181740"/>
+            <a:ext cx="7994" cy="1029600"/>
           </a:xfrm>
           <a:prstGeom prst="line">
             <a:avLst/>
@@ -3902,7 +3909,7 @@
         </p:nvSpPr>
         <p:spPr>
           <a:xfrm>
-            <a:off x="11323192" y="2141536"/>
+            <a:off x="11318869" y="2211340"/>
             <a:ext cx="281428" cy="252615"/>
           </a:xfrm>
           <a:prstGeom prst="rect">
@@ -3939,9 +3946,9 @@
           <p:nvPr/>
         </p:nvCxnSpPr>
         <p:spPr>
-          <a:xfrm flipH="1">
-            <a:off x="11469309" y="2409086"/>
-            <a:ext cx="1" cy="3488645"/>
+          <a:xfrm>
+            <a:off x="11467506" y="2497857"/>
+            <a:ext cx="1804" cy="3399874"/>
           </a:xfrm>
           <a:prstGeom prst="line">
             <a:avLst/>
@@ -4013,7 +4020,7 @@
         </p:nvCxnSpPr>
         <p:spPr>
           <a:xfrm flipH="1">
-            <a:off x="10194232" y="2360330"/>
+            <a:off x="10194231" y="2393641"/>
             <a:ext cx="1102891" cy="0"/>
           </a:xfrm>
           <a:prstGeom prst="straightConnector1">
@@ -4079,13 +4086,15 @@
       <p:cxnSp>
         <p:nvCxnSpPr>
           <p:cNvPr id="58" name="Straight Connector 57"/>
-          <p:cNvCxnSpPr/>
+          <p:cNvCxnSpPr>
+            <a:endCxn id="26" idx="2"/>
+          </p:cNvCxnSpPr>
           <p:nvPr/>
         </p:nvCxnSpPr>
         <p:spPr>
           <a:xfrm>
             <a:off x="8216984" y="3140766"/>
-            <a:ext cx="18590" cy="2743200"/>
+            <a:ext cx="403" cy="13765"/>
           </a:xfrm>
           <a:prstGeom prst="line">
             <a:avLst/>
@@ -4120,8 +4129,8 @@
         </p:nvCxnSpPr>
         <p:spPr>
           <a:xfrm flipH="1">
-            <a:off x="6934200" y="3022104"/>
-            <a:ext cx="1108945" cy="0"/>
+            <a:off x="6872055" y="3022104"/>
+            <a:ext cx="1171091" cy="0"/>
           </a:xfrm>
           <a:prstGeom prst="straightConnector1">
             <a:avLst/>
@@ -4157,8 +4166,8 @@
         </p:nvSpPr>
         <p:spPr>
           <a:xfrm>
-            <a:off x="6203963" y="847918"/>
-            <a:ext cx="1169802" cy="318494"/>
+            <a:off x="6529700" y="847918"/>
+            <a:ext cx="936197" cy="318494"/>
           </a:xfrm>
           <a:prstGeom prst="rect">
             <a:avLst/>
@@ -4186,27 +4195,27 @@
           <a:p>
             <a:pPr algn="ctr"/>
             <a:r>
-              <a:rPr lang="en-US" sz="1200" dirty="0" smtClean="0"/>
+              <a:rPr lang="en-US" sz="900" dirty="0" smtClean="0"/>
               <a:t>:</a:t>
             </a:r>
             <a:r>
-              <a:rPr lang="en-US" sz="1200" dirty="0" err="1" smtClean="0"/>
+              <a:rPr lang="en-US" sz="900" dirty="0" err="1" smtClean="0"/>
               <a:t>LogicManager</a:t>
             </a:r>
-            <a:endParaRPr lang="en-SG" sz="1200" dirty="0"/>
+            <a:endParaRPr lang="en-SG" sz="900" dirty="0"/>
           </a:p>
         </p:txBody>
       </p:sp>
       <p:cxnSp>
         <p:nvCxnSpPr>
-          <p:cNvPr id="62" name="Straight Connector 61"/>
+          <p:cNvPr id="64" name="Straight Connector 63"/>
           <p:cNvCxnSpPr/>
           <p:nvPr/>
         </p:nvCxnSpPr>
         <p:spPr>
-          <a:xfrm flipH="1">
-            <a:off x="8369787" y="1373367"/>
-            <a:ext cx="1" cy="483056"/>
+          <a:xfrm>
+            <a:off x="6712751" y="1181740"/>
+            <a:ext cx="31866" cy="4702226"/>
           </a:xfrm>
           <a:prstGeom prst="line">
             <a:avLst/>
@@ -4233,42 +4242,6 @@
           </a:fontRef>
         </p:style>
       </p:cxnSp>
-      <p:cxnSp>
-        <p:nvCxnSpPr>
-          <p:cNvPr id="64" name="Straight Connector 63"/>
-          <p:cNvCxnSpPr/>
-          <p:nvPr/>
-        </p:nvCxnSpPr>
-        <p:spPr>
-          <a:xfrm>
-            <a:off x="6712751" y="1181740"/>
-            <a:ext cx="31866" cy="4702226"/>
-          </a:xfrm>
-          <a:prstGeom prst="line">
-            <a:avLst/>
-          </a:prstGeom>
-          <a:ln>
-            <a:solidFill>
-              <a:schemeClr val="tx1"/>
-            </a:solidFill>
-            <a:prstDash val="dash"/>
-          </a:ln>
-        </p:spPr>
-        <p:style>
-          <a:lnRef idx="1">
-            <a:schemeClr val="accent1"/>
-          </a:lnRef>
-          <a:fillRef idx="0">
-            <a:schemeClr val="accent1"/>
-          </a:fillRef>
-          <a:effectRef idx="0">
-            <a:schemeClr val="accent1"/>
-          </a:effectRef>
-          <a:fontRef idx="minor">
-            <a:schemeClr val="tx1"/>
-          </a:fontRef>
-        </p:style>
-      </p:cxnSp>
       <p:sp>
         <p:nvSpPr>
           <p:cNvPr id="65" name="Rectangle 64"/>
@@ -4277,8 +4250,8 @@
         </p:nvSpPr>
         <p:spPr>
           <a:xfrm>
-            <a:off x="6590627" y="1632749"/>
-            <a:ext cx="281428" cy="1750531"/>
+            <a:off x="6597265" y="1736966"/>
+            <a:ext cx="281428" cy="1521782"/>
           </a:xfrm>
           <a:prstGeom prst="rect">
             <a:avLst/>
@@ -4317,7 +4290,7 @@
         </p:nvCxnSpPr>
         <p:spPr>
           <a:xfrm>
-            <a:off x="6934200" y="1856423"/>
+            <a:off x="6913889" y="1962542"/>
             <a:ext cx="1104016" cy="0"/>
           </a:xfrm>
           <a:prstGeom prst="straightConnector1">
@@ -4353,7 +4326,7 @@
         </p:nvSpPr>
         <p:spPr>
           <a:xfrm>
-            <a:off x="6836910" y="1494455"/>
+            <a:off x="6832126" y="1655758"/>
             <a:ext cx="1868557" cy="261610"/>
           </a:xfrm>
           <a:prstGeom prst="rect">
@@ -4373,7 +4346,11 @@
             </a:r>
             <a:r>
               <a:rPr lang="en-US" sz="1050" dirty="0" smtClean="0"/>
-              <a:t>(add)_</a:t>
+              <a:t>(add</a:t>
+            </a:r>
+            <a:r>
+              <a:rPr lang="en-US" sz="1050" dirty="0" smtClean="0"/>
+              <a:t>)</a:t>
             </a:r>
             <a:endParaRPr lang="en-SG" sz="1050" dirty="0"/>
           </a:p>
@@ -4435,8 +4412,8 @@
         </p:nvCxnSpPr>
         <p:spPr>
           <a:xfrm flipH="1">
-            <a:off x="2061418" y="1230427"/>
-            <a:ext cx="1" cy="3969912"/>
+            <a:off x="2061419" y="1230427"/>
+            <a:ext cx="1" cy="4681069"/>
           </a:xfrm>
           <a:prstGeom prst="line">
             <a:avLst/>
@@ -4471,8 +4448,8 @@
         </p:nvSpPr>
         <p:spPr>
           <a:xfrm>
-            <a:off x="1934634" y="3154531"/>
-            <a:ext cx="292643" cy="1971191"/>
+            <a:off x="1934634" y="3235386"/>
+            <a:ext cx="292643" cy="1890336"/>
           </a:xfrm>
           <a:prstGeom prst="rect">
             <a:avLst/>
@@ -4511,7 +4488,7 @@
         </p:nvCxnSpPr>
         <p:spPr>
           <a:xfrm flipH="1">
-            <a:off x="1092217" y="2802450"/>
+            <a:off x="1117161" y="3127129"/>
             <a:ext cx="5498410" cy="0"/>
           </a:xfrm>
           <a:prstGeom prst="straightConnector1">
@@ -4595,9 +4572,9 @@
           <p:nvPr/>
         </p:nvCxnSpPr>
         <p:spPr>
-          <a:xfrm flipH="1">
-            <a:off x="3409318" y="1155810"/>
-            <a:ext cx="1" cy="3969912"/>
+          <a:xfrm>
+            <a:off x="3409320" y="1155810"/>
+            <a:ext cx="22575" cy="4741921"/>
           </a:xfrm>
           <a:prstGeom prst="line">
             <a:avLst/>
@@ -4826,7 +4803,7 @@
         </p:nvSpPr>
         <p:spPr>
           <a:xfrm>
-            <a:off x="4542196" y="3865953"/>
+            <a:off x="4529146" y="3919634"/>
             <a:ext cx="287065" cy="524815"/>
           </a:xfrm>
           <a:prstGeom prst="rect">
@@ -4990,7 +4967,7 @@
         </p:nvCxnSpPr>
         <p:spPr>
           <a:xfrm>
-            <a:off x="4849153" y="3914329"/>
+            <a:off x="4847593" y="3995455"/>
             <a:ext cx="133967" cy="10611"/>
           </a:xfrm>
           <a:prstGeom prst="straightConnector1">
@@ -5062,7 +5039,7 @@
         </p:nvCxnSpPr>
         <p:spPr>
           <a:xfrm flipH="1">
-            <a:off x="4830050" y="4264457"/>
+            <a:off x="4829661" y="4302581"/>
             <a:ext cx="591724" cy="5493"/>
           </a:xfrm>
           <a:prstGeom prst="straightConnector1">
@@ -5183,7 +5160,7 @@
         </p:nvCxnSpPr>
         <p:spPr>
           <a:xfrm flipH="1">
-            <a:off x="3647868" y="4386962"/>
+            <a:off x="3654423" y="4433703"/>
             <a:ext cx="858071" cy="2747"/>
           </a:xfrm>
           <a:prstGeom prst="straightConnector1">
@@ -5220,7 +5197,7 @@
         </p:nvCxnSpPr>
         <p:spPr>
           <a:xfrm flipH="1">
-            <a:off x="2284268" y="4866361"/>
+            <a:off x="2260680" y="4879614"/>
             <a:ext cx="977489" cy="0"/>
           </a:xfrm>
           <a:prstGeom prst="straightConnector1">

</xml_diff>